<commit_message>
Guia de Markdown adicionado
</commit_message>
<xml_diff>
--- a/Arquivos de Aulas/Workshop aula 3.pptx
+++ b/Arquivos de Aulas/Workshop aula 3.pptx
@@ -15317,6 +15317,77 @@
               <a:t>*** OU ___ -&gt;  __________________</a:t>
             </a:r>
           </a:p>
+          <a:p>
+            <a:pPr marL="285840" indent="-285120">
+              <a:lnSpc>
+                <a:spcPct val="100000"/>
+              </a:lnSpc>
+              <a:spcAft>
+                <a:spcPts val="1001"/>
+              </a:spcAft>
+              <a:buClr>
+                <a:srgbClr val="FFFFFF"/>
+              </a:buClr>
+              <a:buFont typeface="Arial"/>
+              <a:buChar char="•"/>
+            </a:pPr>
+            <a:r>
+              <a:rPr lang="pt-BR" sz="2400" spc="-1" dirty="0">
+                <a:solidFill>
+                  <a:srgbClr val="FFFFFF"/>
+                </a:solidFill>
+                <a:latin typeface="Agency FB"/>
+              </a:rPr>
+              <a:t>PARA CONHECER </a:t>
+            </a:r>
+            <a:r>
+              <a:rPr lang="pt-BR" sz="2400" spc="-1" dirty="0">
+                <a:solidFill>
+                  <a:srgbClr val="FFFFFF"/>
+                </a:solidFill>
+              </a:rPr>
+              <a:t>MAIS SOBRE </a:t>
+            </a:r>
+            <a:r>
+              <a:rPr lang="pt-BR" sz="2400" spc="-1">
+                <a:solidFill>
+                  <a:srgbClr val="FFFFFF"/>
+                </a:solidFill>
+              </a:rPr>
+              <a:t>A </a:t>
+            </a:r>
+            <a:r>
+              <a:rPr lang="pt-BR" sz="2400" spc="-1">
+                <a:solidFill>
+                  <a:srgbClr val="FFFFFF"/>
+                </a:solidFill>
+                <a:hlinkClick r:id="rId2"/>
+              </a:rPr>
+              <a:t>LINGUAGEM MARKDOWN</a:t>
+            </a:r>
+            <a:r>
+              <a:rPr lang="pt-BR" sz="2400" spc="-1">
+                <a:solidFill>
+                  <a:srgbClr val="FFFFFF"/>
+                </a:solidFill>
+              </a:rPr>
+              <a:t>, </a:t>
+            </a:r>
+            <a:r>
+              <a:rPr lang="pt-BR" sz="2400" spc="-1" dirty="0">
+                <a:solidFill>
+                  <a:srgbClr val="FFFFFF"/>
+                </a:solidFill>
+              </a:rPr>
+              <a:t>CLIQUE NESSE LINK</a:t>
+            </a:r>
+            <a:endParaRPr lang="pt-BR" sz="2400" spc="-1" dirty="0">
+              <a:solidFill>
+                <a:srgbClr val="FFFFFF"/>
+              </a:solidFill>
+              <a:latin typeface="Agency FB"/>
+            </a:endParaRPr>
+          </a:p>
         </p:txBody>
       </p:sp>
     </p:spTree>
@@ -15810,18 +15881,40 @@
                             </p:stCondLst>
                             <p:childTnLst>
                               <p:par>
-                                <p:cTn id="33" presetID="42" presetClass="exit" presetSubtype="0" fill="hold" grpId="0" nodeType="clickEffect">
+                                <p:cTn id="33" presetID="42" presetClass="entr" presetSubtype="0" fill="hold" nodeType="clickEffect">
                                   <p:stCondLst>
                                     <p:cond delay="0"/>
                                   </p:stCondLst>
                                   <p:childTnLst>
-                                    <p:animEffect transition="out" filter="fade">
-                                      <p:cBhvr>
-                                        <p:cTn id="34" dur="1000"/>
+                                    <p:set>
+                                      <p:cBhvr>
+                                        <p:cTn id="34" dur="1" fill="hold">
+                                          <p:stCondLst>
+                                            <p:cond delay="0"/>
+                                          </p:stCondLst>
+                                        </p:cTn>
                                         <p:tgtEl>
                                           <p:spTgt spid="81">
                                             <p:txEl>
-                                              <p:pRg st="0" end="0"/>
+                                              <p:pRg st="4" end="4"/>
+                                            </p:txEl>
+                                          </p:spTgt>
+                                        </p:tgtEl>
+                                        <p:attrNameLst>
+                                          <p:attrName>style.visibility</p:attrName>
+                                        </p:attrNameLst>
+                                      </p:cBhvr>
+                                      <p:to>
+                                        <p:strVal val="visible"/>
+                                      </p:to>
+                                    </p:set>
+                                    <p:animEffect transition="in" filter="fade">
+                                      <p:cBhvr>
+                                        <p:cTn id="35" dur="1000"/>
+                                        <p:tgtEl>
+                                          <p:spTgt spid="81">
+                                            <p:txEl>
+                                              <p:pRg st="4" end="4"/>
                                             </p:txEl>
                                           </p:spTgt>
                                         </p:tgtEl>
@@ -15829,11 +15922,11 @@
                                     </p:animEffect>
                                     <p:anim calcmode="lin" valueType="num">
                                       <p:cBhvr>
-                                        <p:cTn id="35" dur="1000"/>
+                                        <p:cTn id="36" dur="1000" fill="hold"/>
                                         <p:tgtEl>
                                           <p:spTgt spid="81">
                                             <p:txEl>
-                                              <p:pRg st="0" end="0"/>
+                                              <p:pRg st="4" end="4"/>
                                             </p:txEl>
                                           </p:spTgt>
                                         </p:tgtEl>
@@ -15844,23 +15937,23 @@
                                       <p:tavLst>
                                         <p:tav tm="0">
                                           <p:val>
-                                            <p:strVal val="ppt_x"/>
+                                            <p:strVal val="#ppt_x"/>
                                           </p:val>
                                         </p:tav>
                                         <p:tav tm="100000">
                                           <p:val>
-                                            <p:strVal val="ppt_x"/>
+                                            <p:strVal val="#ppt_x"/>
                                           </p:val>
                                         </p:tav>
                                       </p:tavLst>
                                     </p:anim>
                                     <p:anim calcmode="lin" valueType="num">
                                       <p:cBhvr>
-                                        <p:cTn id="36" dur="1000"/>
+                                        <p:cTn id="37" dur="1000" fill="hold"/>
                                         <p:tgtEl>
                                           <p:spTgt spid="81">
                                             <p:txEl>
-                                              <p:pRg st="0" end="0"/>
+                                              <p:pRg st="4" end="4"/>
                                             </p:txEl>
                                           </p:spTgt>
                                         </p:tgtEl>
@@ -15871,38 +15964,16 @@
                                       <p:tavLst>
                                         <p:tav tm="0">
                                           <p:val>
-                                            <p:strVal val="ppt_y"/>
+                                            <p:strVal val="#ppt_y+.1"/>
                                           </p:val>
                                         </p:tav>
                                         <p:tav tm="100000">
                                           <p:val>
-                                            <p:strVal val="ppt_y+.1"/>
+                                            <p:strVal val="#ppt_y"/>
                                           </p:val>
                                         </p:tav>
                                       </p:tavLst>
                                     </p:anim>
-                                    <p:set>
-                                      <p:cBhvr>
-                                        <p:cTn id="37" dur="1" fill="hold">
-                                          <p:stCondLst>
-                                            <p:cond delay="999"/>
-                                          </p:stCondLst>
-                                        </p:cTn>
-                                        <p:tgtEl>
-                                          <p:spTgt spid="81">
-                                            <p:txEl>
-                                              <p:pRg st="0" end="0"/>
-                                            </p:txEl>
-                                          </p:spTgt>
-                                        </p:tgtEl>
-                                        <p:attrNameLst>
-                                          <p:attrName>style.visibility</p:attrName>
-                                        </p:attrNameLst>
-                                      </p:cBhvr>
-                                      <p:to>
-                                        <p:strVal val="hidden"/>
-                                      </p:to>
-                                    </p:set>
                                   </p:childTnLst>
                                 </p:cTn>
                               </p:par>
@@ -15936,7 +16007,7 @@
                                         <p:tgtEl>
                                           <p:spTgt spid="81">
                                             <p:txEl>
-                                              <p:pRg st="1" end="1"/>
+                                              <p:pRg st="0" end="0"/>
                                             </p:txEl>
                                           </p:spTgt>
                                         </p:tgtEl>
@@ -15948,7 +16019,7 @@
                                         <p:tgtEl>
                                           <p:spTgt spid="81">
                                             <p:txEl>
-                                              <p:pRg st="1" end="1"/>
+                                              <p:pRg st="0" end="0"/>
                                             </p:txEl>
                                           </p:spTgt>
                                         </p:tgtEl>
@@ -15975,7 +16046,7 @@
                                         <p:tgtEl>
                                           <p:spTgt spid="81">
                                             <p:txEl>
-                                              <p:pRg st="1" end="1"/>
+                                              <p:pRg st="0" end="0"/>
                                             </p:txEl>
                                           </p:spTgt>
                                         </p:tgtEl>
@@ -15999,6 +16070,121 @@
                                     <p:set>
                                       <p:cBhvr>
                                         <p:cTn id="44" dur="1" fill="hold">
+                                          <p:stCondLst>
+                                            <p:cond delay="999"/>
+                                          </p:stCondLst>
+                                        </p:cTn>
+                                        <p:tgtEl>
+                                          <p:spTgt spid="81">
+                                            <p:txEl>
+                                              <p:pRg st="0" end="0"/>
+                                            </p:txEl>
+                                          </p:spTgt>
+                                        </p:tgtEl>
+                                        <p:attrNameLst>
+                                          <p:attrName>style.visibility</p:attrName>
+                                        </p:attrNameLst>
+                                      </p:cBhvr>
+                                      <p:to>
+                                        <p:strVal val="hidden"/>
+                                      </p:to>
+                                    </p:set>
+                                  </p:childTnLst>
+                                </p:cTn>
+                              </p:par>
+                            </p:childTnLst>
+                          </p:cTn>
+                        </p:par>
+                      </p:childTnLst>
+                    </p:cTn>
+                  </p:par>
+                  <p:par>
+                    <p:cTn id="45" fill="hold">
+                      <p:stCondLst>
+                        <p:cond delay="indefinite"/>
+                      </p:stCondLst>
+                      <p:childTnLst>
+                        <p:par>
+                          <p:cTn id="46" fill="hold">
+                            <p:stCondLst>
+                              <p:cond delay="0"/>
+                            </p:stCondLst>
+                            <p:childTnLst>
+                              <p:par>
+                                <p:cTn id="47" presetID="42" presetClass="exit" presetSubtype="0" fill="hold" grpId="0" nodeType="clickEffect">
+                                  <p:stCondLst>
+                                    <p:cond delay="0"/>
+                                  </p:stCondLst>
+                                  <p:childTnLst>
+                                    <p:animEffect transition="out" filter="fade">
+                                      <p:cBhvr>
+                                        <p:cTn id="48" dur="1000"/>
+                                        <p:tgtEl>
+                                          <p:spTgt spid="81">
+                                            <p:txEl>
+                                              <p:pRg st="1" end="1"/>
+                                            </p:txEl>
+                                          </p:spTgt>
+                                        </p:tgtEl>
+                                      </p:cBhvr>
+                                    </p:animEffect>
+                                    <p:anim calcmode="lin" valueType="num">
+                                      <p:cBhvr>
+                                        <p:cTn id="49" dur="1000"/>
+                                        <p:tgtEl>
+                                          <p:spTgt spid="81">
+                                            <p:txEl>
+                                              <p:pRg st="1" end="1"/>
+                                            </p:txEl>
+                                          </p:spTgt>
+                                        </p:tgtEl>
+                                        <p:attrNameLst>
+                                          <p:attrName>ppt_x</p:attrName>
+                                        </p:attrNameLst>
+                                      </p:cBhvr>
+                                      <p:tavLst>
+                                        <p:tav tm="0">
+                                          <p:val>
+                                            <p:strVal val="ppt_x"/>
+                                          </p:val>
+                                        </p:tav>
+                                        <p:tav tm="100000">
+                                          <p:val>
+                                            <p:strVal val="ppt_x"/>
+                                          </p:val>
+                                        </p:tav>
+                                      </p:tavLst>
+                                    </p:anim>
+                                    <p:anim calcmode="lin" valueType="num">
+                                      <p:cBhvr>
+                                        <p:cTn id="50" dur="1000"/>
+                                        <p:tgtEl>
+                                          <p:spTgt spid="81">
+                                            <p:txEl>
+                                              <p:pRg st="1" end="1"/>
+                                            </p:txEl>
+                                          </p:spTgt>
+                                        </p:tgtEl>
+                                        <p:attrNameLst>
+                                          <p:attrName>ppt_y</p:attrName>
+                                        </p:attrNameLst>
+                                      </p:cBhvr>
+                                      <p:tavLst>
+                                        <p:tav tm="0">
+                                          <p:val>
+                                            <p:strVal val="ppt_y"/>
+                                          </p:val>
+                                        </p:tav>
+                                        <p:tav tm="100000">
+                                          <p:val>
+                                            <p:strVal val="ppt_y+.1"/>
+                                          </p:val>
+                                        </p:tav>
+                                      </p:tavLst>
+                                    </p:anim>
+                                    <p:set>
+                                      <p:cBhvr>
+                                        <p:cTn id="51" dur="1" fill="hold">
                                           <p:stCondLst>
                                             <p:cond delay="999"/>
                                           </p:stCondLst>
@@ -16022,14 +16208,14 @@
                                 </p:cTn>
                               </p:par>
                               <p:par>
-                                <p:cTn id="45" presetID="42" presetClass="exit" presetSubtype="0" fill="hold" grpId="0" nodeType="withEffect">
+                                <p:cTn id="52" presetID="42" presetClass="exit" presetSubtype="0" fill="hold" grpId="0" nodeType="withEffect">
                                   <p:stCondLst>
                                     <p:cond delay="0"/>
                                   </p:stCondLst>
                                   <p:childTnLst>
                                     <p:animEffect transition="out" filter="fade">
                                       <p:cBhvr>
-                                        <p:cTn id="46" dur="1000"/>
+                                        <p:cTn id="53" dur="1000"/>
                                         <p:tgtEl>
                                           <p:spTgt spid="81">
                                             <p:txEl>
@@ -16041,7 +16227,7 @@
                                     </p:animEffect>
                                     <p:anim calcmode="lin" valueType="num">
                                       <p:cBhvr>
-                                        <p:cTn id="47" dur="1000"/>
+                                        <p:cTn id="54" dur="1000"/>
                                         <p:tgtEl>
                                           <p:spTgt spid="81">
                                             <p:txEl>
@@ -16068,7 +16254,7 @@
                                     </p:anim>
                                     <p:anim calcmode="lin" valueType="num">
                                       <p:cBhvr>
-                                        <p:cTn id="48" dur="1000"/>
+                                        <p:cTn id="55" dur="1000"/>
                                         <p:tgtEl>
                                           <p:spTgt spid="81">
                                             <p:txEl>
@@ -16095,7 +16281,7 @@
                                     </p:anim>
                                     <p:set>
                                       <p:cBhvr>
-                                        <p:cTn id="49" dur="1" fill="hold">
+                                        <p:cTn id="56" dur="1" fill="hold">
                                           <p:stCondLst>
                                             <p:cond delay="999"/>
                                           </p:stCondLst>
@@ -16119,14 +16305,14 @@
                                 </p:cTn>
                               </p:par>
                               <p:par>
-                                <p:cTn id="50" presetID="42" presetClass="exit" presetSubtype="0" fill="hold" grpId="0" nodeType="withEffect">
+                                <p:cTn id="57" presetID="42" presetClass="exit" presetSubtype="0" fill="hold" grpId="0" nodeType="withEffect">
                                   <p:stCondLst>
                                     <p:cond delay="0"/>
                                   </p:stCondLst>
                                   <p:childTnLst>
                                     <p:animEffect transition="out" filter="fade">
                                       <p:cBhvr>
-                                        <p:cTn id="51" dur="1000"/>
+                                        <p:cTn id="58" dur="1000"/>
                                         <p:tgtEl>
                                           <p:spTgt spid="81">
                                             <p:txEl>
@@ -16138,7 +16324,7 @@
                                     </p:animEffect>
                                     <p:anim calcmode="lin" valueType="num">
                                       <p:cBhvr>
-                                        <p:cTn id="52" dur="1000"/>
+                                        <p:cTn id="59" dur="1000"/>
                                         <p:tgtEl>
                                           <p:spTgt spid="81">
                                             <p:txEl>
@@ -16165,7 +16351,7 @@
                                     </p:anim>
                                     <p:anim calcmode="lin" valueType="num">
                                       <p:cBhvr>
-                                        <p:cTn id="53" dur="1000"/>
+                                        <p:cTn id="60" dur="1000"/>
                                         <p:tgtEl>
                                           <p:spTgt spid="81">
                                             <p:txEl>
@@ -16192,7 +16378,7 @@
                                     </p:anim>
                                     <p:set>
                                       <p:cBhvr>
-                                        <p:cTn id="54" dur="1" fill="hold">
+                                        <p:cTn id="61" dur="1" fill="hold">
                                           <p:stCondLst>
                                             <p:cond delay="999"/>
                                           </p:stCondLst>
@@ -16201,6 +16387,103 @@
                                           <p:spTgt spid="81">
                                             <p:txEl>
                                               <p:pRg st="3" end="3"/>
+                                            </p:txEl>
+                                          </p:spTgt>
+                                        </p:tgtEl>
+                                        <p:attrNameLst>
+                                          <p:attrName>style.visibility</p:attrName>
+                                        </p:attrNameLst>
+                                      </p:cBhvr>
+                                      <p:to>
+                                        <p:strVal val="hidden"/>
+                                      </p:to>
+                                    </p:set>
+                                  </p:childTnLst>
+                                </p:cTn>
+                              </p:par>
+                              <p:par>
+                                <p:cTn id="62" presetID="42" presetClass="exit" presetSubtype="0" fill="hold" grpId="0" nodeType="withEffect">
+                                  <p:stCondLst>
+                                    <p:cond delay="0"/>
+                                  </p:stCondLst>
+                                  <p:childTnLst>
+                                    <p:animEffect transition="out" filter="fade">
+                                      <p:cBhvr>
+                                        <p:cTn id="63" dur="1000"/>
+                                        <p:tgtEl>
+                                          <p:spTgt spid="81">
+                                            <p:txEl>
+                                              <p:pRg st="4" end="4"/>
+                                            </p:txEl>
+                                          </p:spTgt>
+                                        </p:tgtEl>
+                                      </p:cBhvr>
+                                    </p:animEffect>
+                                    <p:anim calcmode="lin" valueType="num">
+                                      <p:cBhvr>
+                                        <p:cTn id="64" dur="1000"/>
+                                        <p:tgtEl>
+                                          <p:spTgt spid="81">
+                                            <p:txEl>
+                                              <p:pRg st="4" end="4"/>
+                                            </p:txEl>
+                                          </p:spTgt>
+                                        </p:tgtEl>
+                                        <p:attrNameLst>
+                                          <p:attrName>ppt_x</p:attrName>
+                                        </p:attrNameLst>
+                                      </p:cBhvr>
+                                      <p:tavLst>
+                                        <p:tav tm="0">
+                                          <p:val>
+                                            <p:strVal val="ppt_x"/>
+                                          </p:val>
+                                        </p:tav>
+                                        <p:tav tm="100000">
+                                          <p:val>
+                                            <p:strVal val="ppt_x"/>
+                                          </p:val>
+                                        </p:tav>
+                                      </p:tavLst>
+                                    </p:anim>
+                                    <p:anim calcmode="lin" valueType="num">
+                                      <p:cBhvr>
+                                        <p:cTn id="65" dur="1000"/>
+                                        <p:tgtEl>
+                                          <p:spTgt spid="81">
+                                            <p:txEl>
+                                              <p:pRg st="4" end="4"/>
+                                            </p:txEl>
+                                          </p:spTgt>
+                                        </p:tgtEl>
+                                        <p:attrNameLst>
+                                          <p:attrName>ppt_y</p:attrName>
+                                        </p:attrNameLst>
+                                      </p:cBhvr>
+                                      <p:tavLst>
+                                        <p:tav tm="0">
+                                          <p:val>
+                                            <p:strVal val="ppt_y"/>
+                                          </p:val>
+                                        </p:tav>
+                                        <p:tav tm="100000">
+                                          <p:val>
+                                            <p:strVal val="ppt_y+.1"/>
+                                          </p:val>
+                                        </p:tav>
+                                      </p:tavLst>
+                                    </p:anim>
+                                    <p:set>
+                                      <p:cBhvr>
+                                        <p:cTn id="66" dur="1" fill="hold">
+                                          <p:stCondLst>
+                                            <p:cond delay="999"/>
+                                          </p:stCondLst>
+                                        </p:cTn>
+                                        <p:tgtEl>
+                                          <p:spTgt spid="81">
+                                            <p:txEl>
+                                              <p:pRg st="4" end="4"/>
                                             </p:txEl>
                                           </p:spTgt>
                                         </p:tgtEl>

</xml_diff>